<commit_message>
changed code in ppt
</commit_message>
<xml_diff>
--- a/Preisalarm.pptx
+++ b/Preisalarm.pptx
@@ -18772,7 +18772,7 @@
                 <a:cs typeface="Calibri"/>
                 <a:sym typeface="Calibri"/>
               </a:rPr>
-              <a:t>17.07.2025</a:t>
+              <a:t>17. Juli 2025</a:t>
             </a:r>
             <a:endParaRPr sz="1100">
               <a:solidFill>
@@ -25456,7 +25456,7 @@
                 <a:cs typeface="JetBrains Mono"/>
                 <a:sym typeface="JetBrains Mono"/>
               </a:rPr>
-              <a:t>            [key </a:t>
+              <a:t>            [a </a:t>
             </a:r>
             <a:r>
               <a:rPr lang="en-GB">
@@ -25480,7 +25480,7 @@
                 <a:cs typeface="JetBrains Mono"/>
                 <a:sym typeface="JetBrains Mono"/>
               </a:rPr>
-              <a:t>key, value </a:t>
+              <a:t>a, cost </a:t>
             </a:r>
             <a:r>
               <a:rPr lang="en-GB">
@@ -25563,7 +25563,7 @@
                 <a:cs typeface="JetBrains Mono"/>
                 <a:sym typeface="JetBrains Mono"/>
               </a:rPr>
-              <a:t> value </a:t>
+              <a:t> cost </a:t>
             </a:r>
             <a:r>
               <a:rPr lang="en-GB">

</xml_diff>